<commit_message>
add thingspeak, db and csv example
</commit_message>
<xml_diff>
--- a/Node-red_LAB.pptx
+++ b/Node-red_LAB.pptx
@@ -166,10 +166,6 @@
 </p:presentation>
 </file>
 
-<file path=ppt/revisionInfo.xml><?xml version="1.0" encoding="utf-8"?>
-<p1510:revInfo xmlns:a="http://schemas.openxmlformats.org/drawingml/2006/main" xmlns:r="http://schemas.openxmlformats.org/officeDocument/2006/relationships" xmlns:p1510="http://schemas.microsoft.com/office/powerpoint/2015/10/main"/>
-</file>
-
 <file path=ppt/notesMasters/notesMaster1.xml><?xml version="1.0" encoding="utf-8"?>
 <p:notesMaster xmlns:a="http://schemas.openxmlformats.org/drawingml/2006/main" xmlns:r="http://schemas.openxmlformats.org/officeDocument/2006/relationships" xmlns:p="http://schemas.openxmlformats.org/presentationml/2006/main">
   <p:cSld>
@@ -252,7 +248,7 @@
           <a:p>
             <a:fld id="{F880EF89-D504-407B-BF29-0EB0369A843A}" type="datetimeFigureOut">
               <a:rPr lang="zh-TW" altLang="en-US" smtClean="0"/>
-              <a:t>2017/12/4</a:t>
+              <a:t>2018/12/13</a:t>
             </a:fld>
             <a:endParaRPr lang="zh-TW" altLang="en-US"/>
           </a:p>
@@ -1814,7 +1810,7 @@
           <a:p>
             <a:fld id="{71D1DDD2-A828-4230-AD84-C3EA6555D24E}" type="datetimeFigureOut">
               <a:rPr lang="zh-TW" altLang="en-US" smtClean="0"/>
-              <a:t>2017/12/4</a:t>
+              <a:t>2018/12/13</a:t>
             </a:fld>
             <a:endParaRPr lang="zh-TW" altLang="en-US"/>
           </a:p>
@@ -2052,7 +2048,7 @@
           <a:p>
             <a:fld id="{71D1DDD2-A828-4230-AD84-C3EA6555D24E}" type="datetimeFigureOut">
               <a:rPr lang="zh-TW" altLang="en-US" smtClean="0"/>
-              <a:t>2017/12/4</a:t>
+              <a:t>2018/12/13</a:t>
             </a:fld>
             <a:endParaRPr lang="zh-TW" altLang="en-US"/>
           </a:p>
@@ -2232,7 +2228,7 @@
           <a:p>
             <a:fld id="{71D1DDD2-A828-4230-AD84-C3EA6555D24E}" type="datetimeFigureOut">
               <a:rPr lang="zh-TW" altLang="en-US" smtClean="0"/>
-              <a:t>2017/12/4</a:t>
+              <a:t>2018/12/13</a:t>
             </a:fld>
             <a:endParaRPr lang="zh-TW" altLang="en-US"/>
           </a:p>
@@ -2402,7 +2398,7 @@
           <a:p>
             <a:fld id="{71D1DDD2-A828-4230-AD84-C3EA6555D24E}" type="datetimeFigureOut">
               <a:rPr lang="zh-TW" altLang="en-US" smtClean="0"/>
-              <a:t>2017/12/4</a:t>
+              <a:t>2018/12/13</a:t>
             </a:fld>
             <a:endParaRPr lang="zh-TW" altLang="en-US"/>
           </a:p>
@@ -2678,7 +2674,7 @@
           <a:p>
             <a:fld id="{71D1DDD2-A828-4230-AD84-C3EA6555D24E}" type="datetimeFigureOut">
               <a:rPr lang="zh-TW" altLang="en-US" smtClean="0"/>
-              <a:t>2017/12/4</a:t>
+              <a:t>2018/12/13</a:t>
             </a:fld>
             <a:endParaRPr lang="zh-TW" altLang="en-US"/>
           </a:p>
@@ -3879,7 +3875,7 @@
           <a:p>
             <a:fld id="{71D1DDD2-A828-4230-AD84-C3EA6555D24E}" type="datetimeFigureOut">
               <a:rPr lang="zh-TW" altLang="en-US" smtClean="0"/>
-              <a:t>2017/12/4</a:t>
+              <a:t>2018/12/13</a:t>
             </a:fld>
             <a:endParaRPr lang="zh-TW" altLang="en-US"/>
           </a:p>
@@ -4269,7 +4265,7 @@
           <a:p>
             <a:fld id="{71D1DDD2-A828-4230-AD84-C3EA6555D24E}" type="datetimeFigureOut">
               <a:rPr lang="zh-TW" altLang="en-US" smtClean="0"/>
-              <a:t>2017/12/4</a:t>
+              <a:t>2018/12/13</a:t>
             </a:fld>
             <a:endParaRPr lang="zh-TW" altLang="en-US"/>
           </a:p>
@@ -4392,7 +4388,7 @@
           <a:p>
             <a:fld id="{71D1DDD2-A828-4230-AD84-C3EA6555D24E}" type="datetimeFigureOut">
               <a:rPr lang="zh-TW" altLang="en-US" smtClean="0"/>
-              <a:t>2017/12/4</a:t>
+              <a:t>2018/12/13</a:t>
             </a:fld>
             <a:endParaRPr lang="zh-TW" altLang="en-US"/>
           </a:p>
@@ -4487,7 +4483,7 @@
           <a:p>
             <a:fld id="{71D1DDD2-A828-4230-AD84-C3EA6555D24E}" type="datetimeFigureOut">
               <a:rPr lang="zh-TW" altLang="en-US" smtClean="0"/>
-              <a:t>2017/12/4</a:t>
+              <a:t>2018/12/13</a:t>
             </a:fld>
             <a:endParaRPr lang="zh-TW" altLang="en-US"/>
           </a:p>
@@ -5250,7 +5246,7 @@
           <a:p>
             <a:fld id="{71D1DDD2-A828-4230-AD84-C3EA6555D24E}" type="datetimeFigureOut">
               <a:rPr lang="zh-TW" altLang="en-US" smtClean="0"/>
-              <a:t>2017/12/4</a:t>
+              <a:t>2018/12/13</a:t>
             </a:fld>
             <a:endParaRPr lang="zh-TW" altLang="en-US"/>
           </a:p>
@@ -6090,7 +6086,7 @@
           <a:p>
             <a:fld id="{71D1DDD2-A828-4230-AD84-C3EA6555D24E}" type="datetimeFigureOut">
               <a:rPr lang="zh-TW" altLang="en-US" smtClean="0"/>
-              <a:t>2017/12/4</a:t>
+              <a:t>2018/12/13</a:t>
             </a:fld>
             <a:endParaRPr lang="zh-TW" altLang="en-US"/>
           </a:p>
@@ -6317,7 +6313,7 @@
           <a:p>
             <a:fld id="{71D1DDD2-A828-4230-AD84-C3EA6555D24E}" type="datetimeFigureOut">
               <a:rPr lang="zh-TW" altLang="en-US" smtClean="0"/>
-              <a:t>2017/12/4</a:t>
+              <a:t>2018/12/13</a:t>
             </a:fld>
             <a:endParaRPr lang="zh-TW" altLang="en-US"/>
           </a:p>
@@ -8749,15 +8745,7 @@
             </a:pPr>
             <a:r>
               <a:rPr lang="en-US" altLang="zh-TW" sz="1800" dirty="0"/>
-              <a:t>9. </a:t>
-            </a:r>
-            <a:r>
-              <a:rPr lang="en-US" altLang="zh-TW" sz="1800" dirty="0" err="1"/>
-              <a:t>git</a:t>
-            </a:r>
-            <a:r>
-              <a:rPr lang="en-US" altLang="zh-TW" sz="1800" dirty="0"/>
-              <a:t> clone https://github.com/Freeboard/freeboard.git</a:t>
+              <a:t>9. git clone https://github.com/Freeboard/freeboard.git</a:t>
             </a:r>
           </a:p>
           <a:p>
@@ -8799,9 +8787,10 @@
               <a:t>contrib</a:t>
             </a:r>
             <a:r>
-              <a:rPr lang="en-US" altLang="zh-TW" sz="1800" dirty="0"/>
+              <a:rPr lang="en-US" altLang="zh-TW" sz="1800"/>
               <a:t>-freeboard </a:t>
             </a:r>
+            <a:endParaRPr lang="en-US" altLang="zh-TW" sz="1800" dirty="0"/>
           </a:p>
           <a:p>
             <a:pPr marL="0" indent="0">

</xml_diff>